<commit_message>
Added some comments in code
</commit_message>
<xml_diff>
--- a/notes/Bicriteria Paths Problem.pptx
+++ b/notes/Bicriteria Paths Problem.pptx
@@ -302,7 +302,7 @@
             <a:pPr rtl="0"/>
             <a:fld id="{EB190EFE-CCCB-4DCD-B1CF-8C3CB119D6FE}" type="datetime1">
               <a:rPr lang="it-IT" smtClean="0"/>
-              <a:t>05/06/2019</a:t>
+              <a:t>07/06/2019</a:t>
             </a:fld>
             <a:endParaRPr lang="it-IT" dirty="0"/>
           </a:p>
@@ -382,7 +382,7 @@
             <a:pPr rtl="0"/>
             <a:fld id="{B4E85F6F-0FAD-4AD4-850C-7E4CD14D7D70}" type="slidenum">
               <a:rPr lang="it-IT" smtClean="0"/>
-              <a:t>‹N›</a:t>
+              <a:t>‹#›</a:t>
             </a:fld>
             <a:endParaRPr lang="it-IT" dirty="0"/>
           </a:p>
@@ -483,7 +483,7 @@
             <a:fld id="{526AC070-77AE-44FC-B0C8-108B581F9765}" type="datetime1">
               <a:rPr lang="it-IT" noProof="0" smtClean="0"/>
               <a:pPr/>
-              <a:t>05/06/2019</a:t>
+              <a:t>07/06/2019</a:t>
             </a:fld>
             <a:endParaRPr lang="it-IT" noProof="0" dirty="0"/>
           </a:p>
@@ -644,7 +644,7 @@
             <a:pPr rtl="0"/>
             <a:fld id="{BE60DC36-8EFA-4378-9855-E019C55AC472}" type="slidenum">
               <a:rPr lang="it-IT" noProof="0" smtClean="0"/>
-              <a:t>‹N›</a:t>
+              <a:t>‹#›</a:t>
             </a:fld>
             <a:endParaRPr lang="it-IT" noProof="0" dirty="0"/>
           </a:p>
@@ -991,7 +991,7 @@
             <a:pPr rtl="0"/>
             <a:fld id="{73953276-A596-464E-8131-16FDC4642D35}" type="datetime1">
               <a:rPr lang="it-IT" noProof="0" smtClean="0"/>
-              <a:t>05/06/2019</a:t>
+              <a:t>07/06/2019</a:t>
             </a:fld>
             <a:endParaRPr lang="it-IT" noProof="0" dirty="0"/>
           </a:p>
@@ -1047,7 +1047,7 @@
             <a:pPr rtl="0"/>
             <a:fld id="{06FEDF93-2BFD-41CA-ABC7-B039102F3792}" type="slidenum">
               <a:rPr lang="it-IT" noProof="0" smtClean="0"/>
-              <a:t>‹N›</a:t>
+              <a:t>‹#›</a:t>
             </a:fld>
             <a:endParaRPr lang="it-IT" noProof="0" dirty="0"/>
           </a:p>
@@ -1195,7 +1195,7 @@
             <a:pPr rtl="0"/>
             <a:fld id="{59F66E3F-D06F-47DA-A95C-C846DE23F8C0}" type="datetime1">
               <a:rPr lang="it-IT" noProof="0" smtClean="0"/>
-              <a:t>05/06/2019</a:t>
+              <a:t>07/06/2019</a:t>
             </a:fld>
             <a:endParaRPr lang="it-IT" noProof="0" dirty="0"/>
           </a:p>
@@ -1251,7 +1251,7 @@
             <a:pPr rtl="0"/>
             <a:fld id="{06FEDF93-2BFD-41CA-ABC7-B039102F3792}" type="slidenum">
               <a:rPr lang="it-IT" noProof="0" smtClean="0"/>
-              <a:t>‹N›</a:t>
+              <a:t>‹#›</a:t>
             </a:fld>
             <a:endParaRPr lang="it-IT" noProof="0" dirty="0"/>
           </a:p>
@@ -1409,7 +1409,7 @@
             <a:pPr rtl="0"/>
             <a:fld id="{46FE6513-E3C7-4048-AC2F-41B0D1F6D895}" type="datetime1">
               <a:rPr lang="it-IT" noProof="0" smtClean="0"/>
-              <a:t>05/06/2019</a:t>
+              <a:t>07/06/2019</a:t>
             </a:fld>
             <a:endParaRPr lang="it-IT" noProof="0" dirty="0"/>
           </a:p>
@@ -1465,7 +1465,7 @@
             <a:pPr rtl="0"/>
             <a:fld id="{06FEDF93-2BFD-41CA-ABC7-B039102F3792}" type="slidenum">
               <a:rPr lang="it-IT" noProof="0" smtClean="0"/>
-              <a:t>‹N›</a:t>
+              <a:t>‹#›</a:t>
             </a:fld>
             <a:endParaRPr lang="it-IT" noProof="0" dirty="0"/>
           </a:p>
@@ -1613,7 +1613,7 @@
             <a:pPr rtl="0"/>
             <a:fld id="{4CA1E7DF-6F8F-47CE-8C70-53A994FBF180}" type="datetime1">
               <a:rPr lang="it-IT" noProof="0" smtClean="0"/>
-              <a:t>05/06/2019</a:t>
+              <a:t>07/06/2019</a:t>
             </a:fld>
             <a:endParaRPr lang="it-IT" noProof="0" dirty="0"/>
           </a:p>
@@ -1669,7 +1669,7 @@
             <a:pPr rtl="0"/>
             <a:fld id="{06FEDF93-2BFD-41CA-ABC7-B039102F3792}" type="slidenum">
               <a:rPr lang="it-IT" noProof="0" smtClean="0"/>
-              <a:t>‹N›</a:t>
+              <a:t>‹#›</a:t>
             </a:fld>
             <a:endParaRPr lang="it-IT" noProof="0" dirty="0"/>
           </a:p>
@@ -1893,7 +1893,7 @@
             <a:pPr rtl="0"/>
             <a:fld id="{2CFB8710-ABAB-4285-AF31-02779743E1F4}" type="datetime1">
               <a:rPr lang="it-IT" noProof="0" smtClean="0"/>
-              <a:t>05/06/2019</a:t>
+              <a:t>07/06/2019</a:t>
             </a:fld>
             <a:endParaRPr lang="it-IT" noProof="0" dirty="0"/>
           </a:p>
@@ -1949,7 +1949,7 @@
             <a:pPr rtl="0"/>
             <a:fld id="{06FEDF93-2BFD-41CA-ABC7-B039102F3792}" type="slidenum">
               <a:rPr lang="it-IT" noProof="0" smtClean="0"/>
-              <a:t>‹N›</a:t>
+              <a:t>‹#›</a:t>
             </a:fld>
             <a:endParaRPr lang="it-IT" noProof="0" dirty="0"/>
           </a:p>
@@ -2165,7 +2165,7 @@
             <a:pPr rtl="0"/>
             <a:fld id="{FE1FD3F1-0F70-4F3C-841E-3B4B1A9982AD}" type="datetime1">
               <a:rPr lang="it-IT" noProof="0" smtClean="0"/>
-              <a:t>05/06/2019</a:t>
+              <a:t>07/06/2019</a:t>
             </a:fld>
             <a:endParaRPr lang="it-IT" noProof="0" dirty="0"/>
           </a:p>
@@ -2221,7 +2221,7 @@
             <a:pPr rtl="0"/>
             <a:fld id="{06FEDF93-2BFD-41CA-ABC7-B039102F3792}" type="slidenum">
               <a:rPr lang="it-IT" noProof="0" smtClean="0"/>
-              <a:t>‹N›</a:t>
+              <a:t>‹#›</a:t>
             </a:fld>
             <a:endParaRPr lang="it-IT" noProof="0" dirty="0"/>
           </a:p>
@@ -2584,7 +2584,7 @@
             <a:pPr rtl="0"/>
             <a:fld id="{3195CD94-E959-4436-A899-6BFB5CD81E9E}" type="datetime1">
               <a:rPr lang="it-IT" noProof="0" smtClean="0"/>
-              <a:t>05/06/2019</a:t>
+              <a:t>07/06/2019</a:t>
             </a:fld>
             <a:endParaRPr lang="it-IT" noProof="0" dirty="0"/>
           </a:p>
@@ -2640,7 +2640,7 @@
             <a:pPr rtl="0"/>
             <a:fld id="{06FEDF93-2BFD-41CA-ABC7-B039102F3792}" type="slidenum">
               <a:rPr lang="it-IT" noProof="0" smtClean="0"/>
-              <a:t>‹N›</a:t>
+              <a:t>‹#›</a:t>
             </a:fld>
             <a:endParaRPr lang="it-IT" noProof="0" dirty="0"/>
           </a:p>
@@ -2730,7 +2730,7 @@
             <a:pPr rtl="0"/>
             <a:fld id="{327B0C7F-749B-466A-A38A-03B1C8A2F06C}" type="datetime1">
               <a:rPr lang="it-IT" noProof="0" smtClean="0"/>
-              <a:t>05/06/2019</a:t>
+              <a:t>07/06/2019</a:t>
             </a:fld>
             <a:endParaRPr lang="it-IT" noProof="0" dirty="0"/>
           </a:p>
@@ -2786,7 +2786,7 @@
             <a:pPr rtl="0"/>
             <a:fld id="{06FEDF93-2BFD-41CA-ABC7-B039102F3792}" type="slidenum">
               <a:rPr lang="it-IT" noProof="0" smtClean="0"/>
-              <a:t>‹N›</a:t>
+              <a:t>‹#›</a:t>
             </a:fld>
             <a:endParaRPr lang="it-IT" noProof="0" dirty="0"/>
           </a:p>
@@ -2846,7 +2846,7 @@
             <a:pPr rtl="0"/>
             <a:fld id="{DEC309BE-2E90-45F2-A626-98CE1308C9C4}" type="datetime1">
               <a:rPr lang="it-IT" noProof="0" smtClean="0"/>
-              <a:t>05/06/2019</a:t>
+              <a:t>07/06/2019</a:t>
             </a:fld>
             <a:endParaRPr lang="it-IT" noProof="0" dirty="0"/>
           </a:p>
@@ -2902,7 +2902,7 @@
             <a:pPr rtl="0"/>
             <a:fld id="{06FEDF93-2BFD-41CA-ABC7-B039102F3792}" type="slidenum">
               <a:rPr lang="it-IT" noProof="0" smtClean="0"/>
-              <a:t>‹N›</a:t>
+              <a:t>‹#›</a:t>
             </a:fld>
             <a:endParaRPr lang="it-IT" noProof="0" dirty="0"/>
           </a:p>
@@ -3163,7 +3163,7 @@
             <a:pPr rtl="0"/>
             <a:fld id="{D7D791A9-9A19-4C7D-9EDF-F6B9F670B73C}" type="datetime1">
               <a:rPr lang="it-IT" noProof="0" smtClean="0"/>
-              <a:t>05/06/2019</a:t>
+              <a:t>07/06/2019</a:t>
             </a:fld>
             <a:endParaRPr lang="it-IT" noProof="0" dirty="0"/>
           </a:p>
@@ -3219,7 +3219,7 @@
             <a:pPr rtl="0"/>
             <a:fld id="{06FEDF93-2BFD-41CA-ABC7-B039102F3792}" type="slidenum">
               <a:rPr lang="it-IT" noProof="0" smtClean="0"/>
-              <a:t>‹N›</a:t>
+              <a:t>‹#›</a:t>
             </a:fld>
             <a:endParaRPr lang="it-IT" noProof="0" dirty="0"/>
           </a:p>
@@ -3461,7 +3461,7 @@
             <a:pPr rtl="0"/>
             <a:fld id="{1C87147A-BE07-4D89-850F-642EAF1AAEA9}" type="datetime1">
               <a:rPr lang="it-IT" noProof="0" smtClean="0"/>
-              <a:t>05/06/2019</a:t>
+              <a:t>07/06/2019</a:t>
             </a:fld>
             <a:endParaRPr lang="it-IT" noProof="0" dirty="0"/>
           </a:p>
@@ -3517,7 +3517,7 @@
             <a:pPr rtl="0"/>
             <a:fld id="{06FEDF93-2BFD-41CA-ABC7-B039102F3792}" type="slidenum">
               <a:rPr lang="it-IT" noProof="0" smtClean="0"/>
-              <a:t>‹N›</a:t>
+              <a:t>‹#›</a:t>
             </a:fld>
             <a:endParaRPr lang="it-IT" noProof="0" dirty="0"/>
           </a:p>
@@ -3706,7 +3706,7 @@
             <a:pPr rtl="0"/>
             <a:fld id="{750AD8DE-E201-43F1-B9CB-48547493CA6A}" type="datetime1">
               <a:rPr lang="it-IT" noProof="0" smtClean="0"/>
-              <a:t>05/06/2019</a:t>
+              <a:t>07/06/2019</a:t>
             </a:fld>
             <a:endParaRPr lang="it-IT" noProof="0" dirty="0"/>
           </a:p>
@@ -3798,7 +3798,7 @@
             <a:pPr rtl="0"/>
             <a:fld id="{06FEDF93-2BFD-41CA-ABC7-B039102F3792}" type="slidenum">
               <a:rPr lang="it-IT" noProof="0" smtClean="0"/>
-              <a:t>‹N›</a:t>
+              <a:t>‹#›</a:t>
             </a:fld>
             <a:endParaRPr lang="it-IT" noProof="0" dirty="0"/>
           </a:p>
@@ -6770,8 +6770,8 @@
           </a:p>
         </p:txBody>
       </p:sp>
-      <mc:AlternateContent xmlns:mc="http://schemas.openxmlformats.org/markup-compatibility/2006">
-        <mc:Choice xmlns:a14="http://schemas.microsoft.com/office/drawing/2010/main" Requires="a14">
+      <mc:AlternateContent xmlns:mc="http://schemas.openxmlformats.org/markup-compatibility/2006" xmlns:a14="http://schemas.microsoft.com/office/drawing/2010/main">
+        <mc:Choice Requires="a14">
           <p:sp>
             <p:nvSpPr>
               <p:cNvPr id="3" name="CasellaDiTesto 2">
@@ -6800,6 +6800,7 @@
               </a:bodyPr>
               <a:lstStyle/>
               <a:p>
+                <a:pPr/>
                 <a14:m>
                   <m:oMathPara xmlns:m="http://schemas.openxmlformats.org/officeDocument/2006/math">
                     <m:oMathParaPr>
@@ -7011,7 +7012,7 @@
             </p:txBody>
           </p:sp>
         </mc:Choice>
-        <mc:Fallback>
+        <mc:Fallback xmlns="">
           <p:sp>
             <p:nvSpPr>
               <p:cNvPr id="3" name="CasellaDiTesto 2">
@@ -8727,8 +8728,8 @@
           </a:p>
         </p:txBody>
       </p:sp>
-      <mc:AlternateContent xmlns:mc="http://schemas.openxmlformats.org/markup-compatibility/2006" xmlns:a14="http://schemas.microsoft.com/office/drawing/2010/main">
-        <mc:Choice Requires="a14">
+      <mc:AlternateContent xmlns:mc="http://schemas.openxmlformats.org/markup-compatibility/2006">
+        <mc:Choice xmlns:a14="http://schemas.microsoft.com/office/drawing/2010/main" Requires="a14">
           <p:sp>
             <p:nvSpPr>
               <p:cNvPr id="3" name="Segnaposto contenuto 2">
@@ -8747,8 +8748,8 @@
             </p:nvSpPr>
             <p:spPr>
               <a:xfrm>
-                <a:off x="4702588" y="1412488"/>
-                <a:ext cx="3427283" cy="4363844"/>
+                <a:off x="4702588" y="89771"/>
+                <a:ext cx="3427283" cy="4823919"/>
               </a:xfrm>
             </p:spPr>
             <p:txBody>
@@ -9124,7 +9125,7 @@
             </p:txBody>
           </p:sp>
         </mc:Choice>
-        <mc:Fallback xmlns="">
+        <mc:Fallback>
           <p:sp>
             <p:nvSpPr>
               <p:cNvPr id="3" name="Segnaposto contenuto 2">
@@ -9143,13 +9144,13 @@
             </p:nvSpPr>
             <p:spPr>
               <a:xfrm>
-                <a:off x="4702588" y="1412488"/>
-                <a:ext cx="3427283" cy="4363844"/>
+                <a:off x="4702588" y="89771"/>
+                <a:ext cx="3427283" cy="4823919"/>
               </a:xfrm>
               <a:blipFill>
                 <a:blip r:embed="rId2"/>
                 <a:stretch>
-                  <a:fillRect l="-1776" t="-1397" r="-888"/>
+                  <a:fillRect l="-1776" t="-1264" r="-888"/>
                 </a:stretch>
               </a:blipFill>
             </p:spPr>
@@ -9158,7 +9159,7 @@
               <a:lstStyle/>
               <a:p>
                 <a:r>
-                  <a:rPr lang="en-GB">
+                  <a:rPr lang="it-IT">
                     <a:noFill/>
                   </a:rPr>
                   <a:t> </a:t>
@@ -9241,12 +9242,12 @@
         </p:nvSpPr>
         <p:spPr>
           <a:xfrm>
-            <a:off x="8451604" y="1412489"/>
+            <a:off x="8451604" y="147282"/>
             <a:ext cx="3197701" cy="2902451"/>
           </a:xfrm>
         </p:spPr>
         <p:txBody>
-          <a:bodyPr>
+          <a:bodyPr vert="horz" lIns="91440" tIns="45720" rIns="91440" bIns="45720" rtlCol="0" anchor="t">
             <a:normAutofit/>
           </a:bodyPr>
           <a:lstStyle/>
@@ -9255,8 +9256,20 @@
               <a:buNone/>
             </a:pPr>
             <a:r>
+              <a:rPr lang="it-IT" sz="2000" b="1" i="1" dirty="0" err="1"/>
+              <a:t>Convex</a:t>
+            </a:r>
+            <a:r>
               <a:rPr lang="it-IT" sz="2000" b="1" i="1" dirty="0"/>
-              <a:t>Pareto front:</a:t>
+              <a:t> </a:t>
+            </a:r>
+            <a:r>
+              <a:rPr lang="it-IT" sz="2000" b="1" i="1" dirty="0" err="1"/>
+              <a:t>hull</a:t>
+            </a:r>
+            <a:r>
+              <a:rPr lang="it-IT" sz="2000" b="1" i="1" dirty="0"/>
+              <a:t>:</a:t>
             </a:r>
           </a:p>
           <a:p>
@@ -9271,16 +9284,43 @@
             </a:pPr>
             <a:r>
               <a:rPr lang="en-GB" sz="2000" dirty="0"/>
-              <a:t>For a given set of feasible solutions there is a subset of </a:t>
+              <a:t>The </a:t>
             </a:r>
             <a:r>
               <a:rPr lang="en-GB" sz="2000" b="1" dirty="0"/>
-              <a:t>optimal solutions</a:t>
+              <a:t>convex hull</a:t>
+            </a:r>
+            <a:r>
+              <a:rPr lang="en-GB" sz="2000" dirty="0"/>
+              <a:t> of a set </a:t>
+            </a:r>
+            <a:r>
+              <a:rPr lang="en-GB" sz="2000" i="1" dirty="0"/>
+              <a:t>X </a:t>
+            </a:r>
+            <a:r>
+              <a:rPr lang="en-GB" sz="2000" dirty="0"/>
+              <a:t> of feasible solution is the smallest </a:t>
+            </a:r>
+            <a:r>
+              <a:rPr lang="en-GB" sz="2000" b="1" dirty="0"/>
+              <a:t>convex set</a:t>
+            </a:r>
+            <a:r>
+              <a:rPr lang="en-GB" sz="2000" dirty="0"/>
+              <a:t> that contains </a:t>
+            </a:r>
+            <a:r>
+              <a:rPr lang="en-GB" sz="2000" i="1" dirty="0"/>
+              <a:t>X</a:t>
             </a:r>
             <a:r>
               <a:rPr lang="en-GB" sz="2000" dirty="0"/>
               <a:t>.</a:t>
             </a:r>
+            <a:endParaRPr lang="en-GB" sz="2000" b="1" dirty="0">
+              <a:cs typeface="Segoe UI Light"/>
+            </a:endParaRPr>
           </a:p>
         </p:txBody>
       </p:sp>
@@ -9298,7 +9338,7 @@
         </p:nvSpPr>
         <p:spPr>
           <a:xfrm>
-            <a:off x="9812459" y="3153772"/>
+            <a:off x="9884346" y="2190489"/>
             <a:ext cx="475989" cy="989556"/>
           </a:xfrm>
           <a:prstGeom prst="downArrow">
@@ -9344,7 +9384,7 @@
         </p:nvSpPr>
         <p:spPr>
           <a:xfrm>
-            <a:off x="9054634" y="4288103"/>
+            <a:off x="9126521" y="3252933"/>
             <a:ext cx="1991638" cy="646331"/>
           </a:xfrm>
           <a:prstGeom prst="rect">
@@ -9387,8 +9427,8 @@
           </a:p>
         </p:txBody>
       </p:sp>
-      <mc:AlternateContent xmlns:mc="http://schemas.openxmlformats.org/markup-compatibility/2006" xmlns:a14="http://schemas.microsoft.com/office/drawing/2010/main">
-        <mc:Choice Requires="a14">
+      <mc:AlternateContent xmlns:mc="http://schemas.openxmlformats.org/markup-compatibility/2006">
+        <mc:Choice xmlns:a14="http://schemas.microsoft.com/office/drawing/2010/main" Requires="a14">
           <p:sp>
             <p:nvSpPr>
               <p:cNvPr id="7" name="CasellaDiTesto 6">
@@ -9403,7 +9443,7 @@
             </p:nvSpPr>
             <p:spPr>
               <a:xfrm>
-                <a:off x="8722365" y="5070088"/>
+                <a:off x="8880516" y="3905522"/>
                 <a:ext cx="2670090" cy="1231106"/>
               </a:xfrm>
               <a:prstGeom prst="rect">
@@ -9587,7 +9627,7 @@
             </p:txBody>
           </p:sp>
         </mc:Choice>
-        <mc:Fallback xmlns="">
+        <mc:Fallback>
           <p:sp>
             <p:nvSpPr>
               <p:cNvPr id="7" name="CasellaDiTesto 6">
@@ -9604,7 +9644,7 @@
             </p:nvSpPr>
             <p:spPr>
               <a:xfrm>
-                <a:off x="8722365" y="5070088"/>
+                <a:off x="8880516" y="3905522"/>
                 <a:ext cx="2670090" cy="1231106"/>
               </a:xfrm>
               <a:prstGeom prst="rect">
@@ -9622,7 +9662,7 @@
               <a:lstStyle/>
               <a:p>
                 <a:r>
-                  <a:rPr lang="en-GB">
+                  <a:rPr lang="it-IT">
                     <a:noFill/>
                   </a:rPr>
                   <a:t> </a:t>
@@ -9632,6 +9672,290 @@
           </p:sp>
         </mc:Fallback>
       </mc:AlternateContent>
+      <p:cxnSp>
+        <p:nvCxnSpPr>
+          <p:cNvPr id="8" name="Straight Arrow Connector 7">
+            <a:extLst>
+              <a:ext uri="{FF2B5EF4-FFF2-40B4-BE49-F238E27FC236}">
+                <a16:creationId xmlns:a16="http://schemas.microsoft.com/office/drawing/2014/main" id="{1594F14F-4E3B-4AA3-91C3-327E51221F66}"/>
+              </a:ext>
+            </a:extLst>
+          </p:cNvPr>
+          <p:cNvCxnSpPr/>
+          <p:nvPr/>
+        </p:nvCxnSpPr>
+        <p:spPr>
+          <a:xfrm>
+            <a:off x="4546121" y="3345612"/>
+            <a:ext cx="3579961" cy="0"/>
+          </a:xfrm>
+          <a:prstGeom prst="straightConnector1">
+            <a:avLst/>
+          </a:prstGeom>
+          <a:ln>
+            <a:solidFill>
+              <a:schemeClr val="tx1">
+                <a:lumMod val="50000"/>
+                <a:lumOff val="50000"/>
+              </a:schemeClr>
+            </a:solidFill>
+          </a:ln>
+        </p:spPr>
+        <p:style>
+          <a:lnRef idx="1">
+            <a:schemeClr val="accent2"/>
+          </a:lnRef>
+          <a:fillRef idx="0">
+            <a:schemeClr val="accent2"/>
+          </a:fillRef>
+          <a:effectRef idx="0">
+            <a:schemeClr val="accent2"/>
+          </a:effectRef>
+          <a:fontRef idx="minor">
+            <a:schemeClr val="tx1"/>
+          </a:fontRef>
+        </p:style>
+      </p:cxnSp>
+      <p:sp>
+        <p:nvSpPr>
+          <p:cNvPr id="9" name="TextBox 8">
+            <a:extLst>
+              <a:ext uri="{FF2B5EF4-FFF2-40B4-BE49-F238E27FC236}">
+                <a16:creationId xmlns:a16="http://schemas.microsoft.com/office/drawing/2014/main" id="{26E1A082-5134-48F8-92BD-0D00CFBA8136}"/>
+              </a:ext>
+            </a:extLst>
+          </p:cNvPr>
+          <p:cNvSpPr txBox="1"/>
+          <p:nvPr/>
+        </p:nvSpPr>
+        <p:spPr>
+          <a:xfrm>
+            <a:off x="4867275" y="3343275"/>
+            <a:ext cx="2743200" cy="461665"/>
+          </a:xfrm>
+          <a:prstGeom prst="rect">
+            <a:avLst/>
+          </a:prstGeom>
+          <a:noFill/>
+        </p:spPr>
+        <p:txBody>
+          <a:bodyPr rot="0" spcFirstLastPara="0" vertOverflow="overflow" horzOverflow="overflow" vert="horz" wrap="square" lIns="91440" tIns="45720" rIns="91440" bIns="45720" numCol="1" spcCol="0" rtlCol="0" fromWordArt="0" anchor="t" anchorCtr="0" forceAA="0" compatLnSpc="1">
+            <a:prstTxWarp prst="textNoShape">
+              <a:avLst/>
+            </a:prstTxWarp>
+            <a:spAutoFit/>
+          </a:bodyPr>
+          <a:lstStyle/>
+          <a:p>
+            <a:pPr algn="ctr"/>
+            <a:r>
+              <a:rPr lang="it-IT" sz="2400" b="1" i="1" dirty="0"/>
+              <a:t>Pareto front</a:t>
+            </a:r>
+            <a:endParaRPr lang="it-IT" sz="2400" b="1" i="1" dirty="0">
+              <a:cs typeface="Segoe UI Light"/>
+            </a:endParaRPr>
+          </a:p>
+        </p:txBody>
+      </p:sp>
+      <p:sp>
+        <p:nvSpPr>
+          <p:cNvPr id="10" name="TextBox 9">
+            <a:extLst>
+              <a:ext uri="{FF2B5EF4-FFF2-40B4-BE49-F238E27FC236}">
+                <a16:creationId xmlns:a16="http://schemas.microsoft.com/office/drawing/2014/main" id="{88F16203-8D99-4229-A4D3-7D276ADC920D}"/>
+              </a:ext>
+            </a:extLst>
+          </p:cNvPr>
+          <p:cNvSpPr txBox="1"/>
+          <p:nvPr/>
+        </p:nvSpPr>
+        <p:spPr>
+          <a:xfrm>
+            <a:off x="4550075" y="3903094"/>
+            <a:ext cx="3505199" cy="2031325"/>
+          </a:xfrm>
+          <a:prstGeom prst="rect">
+            <a:avLst/>
+          </a:prstGeom>
+          <a:noFill/>
+        </p:spPr>
+        <p:txBody>
+          <a:bodyPr rot="0" spcFirstLastPara="0" vertOverflow="overflow" horzOverflow="overflow" vert="horz" wrap="square" lIns="91440" tIns="45720" rIns="91440" bIns="45720" numCol="1" spcCol="0" rtlCol="0" fromWordArt="0" anchor="t" anchorCtr="0" forceAA="0" compatLnSpc="1">
+            <a:prstTxWarp prst="textNoShape">
+              <a:avLst/>
+            </a:prstTxWarp>
+            <a:spAutoFit/>
+          </a:bodyPr>
+          <a:lstStyle/>
+          <a:p>
+            <a:r>
+              <a:rPr lang="it-IT" dirty="0"/>
+              <a:t>A set of </a:t>
+            </a:r>
+            <a:r>
+              <a:rPr lang="it-IT" dirty="0" err="1"/>
+              <a:t>optimal</a:t>
+            </a:r>
+            <a:r>
+              <a:rPr lang="it-IT" dirty="0"/>
+              <a:t> </a:t>
+            </a:r>
+            <a:r>
+              <a:rPr lang="it-IT" dirty="0" err="1"/>
+              <a:t>solutions</a:t>
+            </a:r>
+            <a:r>
+              <a:rPr lang="it-IT" dirty="0"/>
+              <a:t>.</a:t>
+            </a:r>
+            <a:endParaRPr lang="it-IT" dirty="0">
+              <a:cs typeface="Segoe UI Light"/>
+            </a:endParaRPr>
+          </a:p>
+          <a:p>
+            <a:r>
+              <a:rPr lang="it-IT" dirty="0">
+                <a:cs typeface="Segoe UI Light"/>
+              </a:rPr>
+              <a:t>A set of </a:t>
+            </a:r>
+            <a:r>
+              <a:rPr lang="it-IT" dirty="0" err="1">
+                <a:cs typeface="Segoe UI Light"/>
+              </a:rPr>
+              <a:t>not-dominated</a:t>
+            </a:r>
+            <a:r>
+              <a:rPr lang="it-IT" dirty="0">
+                <a:cs typeface="Segoe UI Light"/>
+              </a:rPr>
+              <a:t> points (no </a:t>
+            </a:r>
+            <a:r>
+              <a:rPr lang="it-IT" dirty="0" err="1">
+                <a:cs typeface="Segoe UI Light"/>
+              </a:rPr>
+              <a:t>other</a:t>
+            </a:r>
+            <a:r>
+              <a:rPr lang="it-IT" dirty="0">
+                <a:cs typeface="Segoe UI Light"/>
+              </a:rPr>
+              <a:t> point with </a:t>
+            </a:r>
+            <a:r>
+              <a:rPr lang="it-IT" dirty="0" err="1">
+                <a:cs typeface="Segoe UI Light"/>
+              </a:rPr>
+              <a:t>better</a:t>
+            </a:r>
+            <a:r>
+              <a:rPr lang="it-IT" dirty="0">
+                <a:cs typeface="Segoe UI Light"/>
+              </a:rPr>
+              <a:t> </a:t>
+            </a:r>
+            <a:r>
+              <a:rPr lang="it-IT" dirty="0" err="1">
+                <a:cs typeface="Segoe UI Light"/>
+              </a:rPr>
+              <a:t>values</a:t>
+            </a:r>
+            <a:r>
+              <a:rPr lang="it-IT" dirty="0">
+                <a:cs typeface="Segoe UI Light"/>
+              </a:rPr>
+              <a:t> for </a:t>
+            </a:r>
+            <a:r>
+              <a:rPr lang="it-IT" dirty="0" err="1">
+                <a:cs typeface="Segoe UI Light"/>
+              </a:rPr>
+              <a:t>each</a:t>
+            </a:r>
+            <a:r>
+              <a:rPr lang="it-IT" dirty="0">
+                <a:cs typeface="Segoe UI Light"/>
+              </a:rPr>
+              <a:t> </a:t>
+            </a:r>
+            <a:r>
+              <a:rPr lang="it-IT" dirty="0" err="1">
+                <a:cs typeface="Segoe UI Light"/>
+              </a:rPr>
+              <a:t>point's</a:t>
+            </a:r>
+            <a:r>
+              <a:rPr lang="it-IT" dirty="0">
+                <a:cs typeface="Segoe UI Light"/>
+              </a:rPr>
+              <a:t> </a:t>
+            </a:r>
+            <a:r>
+              <a:rPr lang="it-IT" dirty="0" err="1">
+                <a:cs typeface="Segoe UI Light"/>
+              </a:rPr>
+              <a:t>critera</a:t>
+            </a:r>
+            <a:r>
+              <a:rPr lang="it-IT" dirty="0">
+                <a:cs typeface="Segoe UI Light"/>
+              </a:rPr>
+              <a:t>).</a:t>
+            </a:r>
+          </a:p>
+          <a:p>
+            <a:endParaRPr lang="it-IT" dirty="0">
+              <a:cs typeface="Segoe UI Light"/>
+            </a:endParaRPr>
+          </a:p>
+          <a:p>
+            <a:r>
+              <a:rPr lang="it-IT" dirty="0">
+                <a:cs typeface="Segoe UI Light"/>
+              </a:rPr>
+              <a:t>A point can be part of Pareto front </a:t>
+            </a:r>
+            <a:r>
+              <a:rPr lang="it-IT" dirty="0" err="1">
+                <a:cs typeface="Segoe UI Light"/>
+              </a:rPr>
+              <a:t>whitout</a:t>
+            </a:r>
+            <a:r>
+              <a:rPr lang="it-IT" dirty="0">
+                <a:cs typeface="Segoe UI Light"/>
+              </a:rPr>
+              <a:t> dominate </a:t>
+            </a:r>
+            <a:r>
+              <a:rPr lang="it-IT" dirty="0" err="1">
+                <a:cs typeface="Segoe UI Light"/>
+              </a:rPr>
+              <a:t>any</a:t>
+            </a:r>
+            <a:r>
+              <a:rPr lang="it-IT" dirty="0">
+                <a:cs typeface="Segoe UI Light"/>
+              </a:rPr>
+              <a:t> </a:t>
+            </a:r>
+            <a:r>
+              <a:rPr lang="it-IT" dirty="0" err="1">
+                <a:cs typeface="Segoe UI Light"/>
+              </a:rPr>
+              <a:t>other</a:t>
+            </a:r>
+            <a:r>
+              <a:rPr lang="it-IT" dirty="0">
+                <a:cs typeface="Segoe UI Light"/>
+              </a:rPr>
+              <a:t> point.</a:t>
+            </a:r>
+          </a:p>
+        </p:txBody>
+      </p:sp>
     </p:spTree>
     <p:extLst>
       <p:ext uri="{BB962C8B-B14F-4D97-AF65-F5344CB8AC3E}">
@@ -9793,8 +10117,8 @@
           </a:p>
         </p:txBody>
       </p:sp>
-      <mc:AlternateContent xmlns:mc="http://schemas.openxmlformats.org/markup-compatibility/2006">
-        <mc:Choice xmlns:a14="http://schemas.microsoft.com/office/drawing/2010/main" Requires="a14">
+      <mc:AlternateContent xmlns:mc="http://schemas.openxmlformats.org/markup-compatibility/2006" xmlns:a14="http://schemas.microsoft.com/office/drawing/2010/main">
+        <mc:Choice Requires="a14">
           <p:sp>
             <p:nvSpPr>
               <p:cNvPr id="8" name="CasellaDiTesto 7">
@@ -9898,7 +10222,7 @@
             </p:txBody>
           </p:sp>
         </mc:Choice>
-        <mc:Fallback>
+        <mc:Fallback xmlns="">
           <p:sp>
             <p:nvSpPr>
               <p:cNvPr id="8" name="CasellaDiTesto 7">
@@ -10076,8 +10400,8 @@
           </a:p>
         </p:txBody>
       </p:sp>
-      <mc:AlternateContent xmlns:mc="http://schemas.openxmlformats.org/markup-compatibility/2006">
-        <mc:Choice xmlns:a14="http://schemas.microsoft.com/office/drawing/2010/main" Requires="a14">
+      <mc:AlternateContent xmlns:mc="http://schemas.openxmlformats.org/markup-compatibility/2006" xmlns:a14="http://schemas.microsoft.com/office/drawing/2010/main">
+        <mc:Choice Requires="a14">
           <p:sp>
             <p:nvSpPr>
               <p:cNvPr id="11" name="CasellaDiTesto 10">
@@ -10224,7 +10548,7 @@
             </p:txBody>
           </p:sp>
         </mc:Choice>
-        <mc:Fallback>
+        <mc:Fallback xmlns="">
           <p:sp>
             <p:nvSpPr>
               <p:cNvPr id="11" name="CasellaDiTesto 10">
@@ -12379,7 +12703,7 @@
           <a:noFill/>
         </p:spPr>
         <p:txBody>
-          <a:bodyPr wrap="square" rtlCol="0">
+          <a:bodyPr wrap="square" rtlCol="0" anchor="t">
             <a:spAutoFit/>
           </a:bodyPr>
           <a:lstStyle/>
@@ -12389,10 +12713,18 @@
               <a:t>= </a:t>
             </a:r>
             <a:r>
+              <a:rPr lang="it-IT" sz="2400" b="1" dirty="0" err="1"/>
+              <a:t>Convex</a:t>
+            </a:r>
+            <a:r>
               <a:rPr lang="it-IT" sz="2400" b="1" dirty="0"/>
-              <a:t>Pareto Front</a:t>
-            </a:r>
-            <a:endParaRPr lang="en-GB" sz="2400" b="1" dirty="0"/>
+              <a:t> </a:t>
+            </a:r>
+            <a:r>
+              <a:rPr lang="it-IT" sz="2400" b="1" dirty="0" err="1"/>
+              <a:t>hull</a:t>
+            </a:r>
+            <a:endParaRPr lang="en-GB" sz="2400" b="1" dirty="0" err="1"/>
           </a:p>
         </p:txBody>
       </p:sp>
@@ -12465,7 +12797,7 @@
         <p:spPr>
           <a:xfrm>
             <a:off x="9359150" y="3514652"/>
-            <a:ext cx="2249907" cy="830997"/>
+            <a:ext cx="2249907" cy="461665"/>
           </a:xfrm>
           <a:prstGeom prst="rect">
             <a:avLst/>
@@ -12473,18 +12805,14 @@
           <a:noFill/>
         </p:spPr>
         <p:txBody>
-          <a:bodyPr wrap="square" rtlCol="0">
+          <a:bodyPr wrap="square" rtlCol="0" anchor="t">
             <a:spAutoFit/>
           </a:bodyPr>
           <a:lstStyle/>
           <a:p>
             <a:r>
               <a:rPr lang="it-IT" sz="2400" b="1" dirty="0"/>
-              <a:t>= Label Setting </a:t>
-            </a:r>
-            <a:r>
-              <a:rPr lang="it-IT" sz="2400" b="1" dirty="0" err="1"/>
-              <a:t>solutions</a:t>
+              <a:t>= Pareto front</a:t>
             </a:r>
             <a:endParaRPr lang="en-GB" sz="2400" b="1" dirty="0"/>
           </a:p>
@@ -12911,8 +13239,8 @@
           </a:p>
         </p:txBody>
       </p:sp>
-      <mc:AlternateContent xmlns:mc="http://schemas.openxmlformats.org/markup-compatibility/2006">
-        <mc:Choice xmlns:a14="http://schemas.microsoft.com/office/drawing/2010/main" Requires="a14">
+      <mc:AlternateContent xmlns:mc="http://schemas.openxmlformats.org/markup-compatibility/2006" xmlns:a14="http://schemas.microsoft.com/office/drawing/2010/main">
+        <mc:Choice Requires="a14">
           <p:sp>
             <p:nvSpPr>
               <p:cNvPr id="8" name="CasellaDiTesto 7">
@@ -13122,7 +13450,7 @@
             </p:txBody>
           </p:sp>
         </mc:Choice>
-        <mc:Fallback>
+        <mc:Fallback xmlns="">
           <p:sp>
             <p:nvSpPr>
               <p:cNvPr id="8" name="CasellaDiTesto 7">
@@ -14182,8 +14510,8 @@
           </a:prstGeom>
         </p:spPr>
       </p:pic>
-      <mc:AlternateContent xmlns:mc="http://schemas.openxmlformats.org/markup-compatibility/2006">
-        <mc:Choice xmlns:a14="http://schemas.microsoft.com/office/drawing/2010/main" Requires="a14">
+      <mc:AlternateContent xmlns:mc="http://schemas.openxmlformats.org/markup-compatibility/2006" xmlns:a14="http://schemas.microsoft.com/office/drawing/2010/main">
+        <mc:Choice Requires="a14">
           <p:sp>
             <p:nvSpPr>
               <p:cNvPr id="10" name="CasellaDiTesto 9">
@@ -14229,6 +14557,7 @@
                 </a:endParaRPr>
               </a:p>
               <a:p>
+                <a:pPr/>
                 <a14:m>
                   <m:oMathPara xmlns:m="http://schemas.openxmlformats.org/officeDocument/2006/math">
                     <m:oMathParaPr>
@@ -14292,7 +14621,7 @@
             </p:txBody>
           </p:sp>
         </mc:Choice>
-        <mc:Fallback>
+        <mc:Fallback xmlns="">
           <p:sp>
             <p:nvSpPr>
               <p:cNvPr id="10" name="CasellaDiTesto 9">
@@ -14571,7 +14900,7 @@
           <a:graphicData uri="http://schemas.openxmlformats.org/presentationml/2006/ole">
             <mc:AlternateContent xmlns:mc="http://schemas.openxmlformats.org/markup-compatibility/2006">
               <mc:Choice xmlns:v="urn:schemas-microsoft-com:vml" Requires="v">
-                <p:oleObj spid="_x0000_s2051" name="Worksheet" r:id="rId3" imgW="8953268" imgH="4143404" progId="Excel.Sheet.12">
+                <p:oleObj spid="_x0000_s2129" name="Worksheet" r:id="rId3" imgW="8953268" imgH="4143404" progId="Excel.Sheet.12">
                   <p:embed/>
                 </p:oleObj>
               </mc:Choice>
@@ -17276,8 +17605,8 @@
           </p:sp>
         </mc:Fallback>
       </mc:AlternateContent>
-      <mc:AlternateContent xmlns:mc="http://schemas.openxmlformats.org/markup-compatibility/2006">
-        <mc:Choice xmlns:a14="http://schemas.microsoft.com/office/drawing/2010/main" Requires="a14">
+      <mc:AlternateContent xmlns:mc="http://schemas.openxmlformats.org/markup-compatibility/2006" xmlns:a14="http://schemas.microsoft.com/office/drawing/2010/main">
+        <mc:Choice Requires="a14">
           <p:sp>
             <p:nvSpPr>
               <p:cNvPr id="7" name="CasellaDiTesto 6">
@@ -17654,7 +17983,7 @@
             </p:txBody>
           </p:sp>
         </mc:Choice>
-        <mc:Fallback>
+        <mc:Fallback xmlns="">
           <p:sp>
             <p:nvSpPr>
               <p:cNvPr id="7" name="CasellaDiTesto 6">

</xml_diff>